<commit_message>
edits to jons slides
classtree
</commit_message>
<xml_diff>
--- a/Project2/LendingClub_Slides_Project_2.pptx
+++ b/Project2/LendingClub_Slides_Project_2.pptx
@@ -30,8 +30,8 @@
     <p:sldId id="307" r:id="rId21"/>
     <p:sldId id="308" r:id="rId22"/>
     <p:sldId id="309" r:id="rId23"/>
-    <p:sldId id="316" r:id="rId24"/>
-    <p:sldId id="317" r:id="rId25"/>
+    <p:sldId id="319" r:id="rId24"/>
+    <p:sldId id="320" r:id="rId25"/>
     <p:sldId id="268" r:id="rId26"/>
     <p:sldId id="263" r:id="rId27"/>
   </p:sldIdLst>
@@ -222,7 +222,7 @@
           <a:p>
             <a:fld id="{48CCDE1B-485C-4B2F-BE21-3D867E8608CA}" type="datetimeFigureOut">
               <a:rPr lang="en-US" smtClean="0"/>
-              <a:t>12/11/2022</a:t>
+              <a:t>12/12/2022</a:t>
             </a:fld>
             <a:endParaRPr lang="en-US"/>
           </a:p>
@@ -1405,79 +1405,415 @@
           <a:lstStyle/>
           <a:p>
             <a:r>
-              <a:rPr lang="en-US" dirty="0"/>
-              <a:t>Explain tree:</a:t>
-            </a:r>
-          </a:p>
-          <a:p>
-            <a:r>
-              <a:rPr lang="en-US" dirty="0"/>
-              <a:t>So you can see that our tree first split the data by number of inquires in the last 6 months, with the threshold here being greater than or equal to 4. Unsurprisingly, loans with four or more inquiries, require a higher FICO score to meet the credit policy. You can see that loans with four or more inquiries AND a FICO score lower than 740 will almost certainly fail to meet the credit policy. </a:t>
-            </a:r>
-          </a:p>
-          <a:p>
-            <a:endParaRPr lang="en-US" dirty="0"/>
-          </a:p>
-          <a:p>
-            <a:r>
-              <a:rPr lang="en-US" dirty="0"/>
-              <a:t>We can see the difference in the requirements for FICO scores when looking at the other side of our tree. A borrower with a FICO score of only 661 or higher will probably meet the credit policy if accompanied by fewer than 4 inquiries in the last 6 months. This also indicates that a FICO score of 660 or lower will almost certainly fail to meet the credit policy regardless of the number of inquiries.</a:t>
-            </a:r>
-          </a:p>
-          <a:p>
-            <a:endParaRPr lang="en-US" dirty="0"/>
-          </a:p>
-          <a:p>
-            <a:r>
-              <a:rPr lang="en-US" dirty="0"/>
-              <a:t>From there, we can see that an established credit history (defined as 1110 days or more here; or about 3 years) is required to meet the credit policy, and that a revolving balance of about $115,000 or lower is more likely to meet the credit policy. </a:t>
-            </a:r>
-          </a:p>
-          <a:p>
-            <a:endParaRPr lang="en-US" dirty="0"/>
-          </a:p>
-          <a:p>
-            <a:r>
-              <a:rPr lang="en-US" dirty="0"/>
-              <a:t>Confusion Matrix:</a:t>
-            </a:r>
-          </a:p>
-          <a:p>
-            <a:r>
-              <a:rPr lang="en-US" dirty="0"/>
-              <a:t>By examining some of the statistics and the confusion matrix for our classification tree, we can see that this model/test is favorable model to move forward with. </a:t>
-            </a:r>
-          </a:p>
-          <a:p>
-            <a:pPr marL="628650" lvl="1" indent="-171450">
+              <a:rPr lang="en-US" sz="800" u="sng" dirty="0"/>
+              <a:t>Intro:</a:t>
+            </a:r>
+          </a:p>
+          <a:p>
+            <a:pPr marL="171450" indent="-171450">
               <a:buFont typeface="Arial" panose="020B0604020202020204" pitchFamily="34" charset="0"/>
               <a:buChar char="•"/>
             </a:pPr>
             <a:r>
-              <a:rPr lang="en-US" dirty="0"/>
-              <a:t>The sensitivity and specificity values indicate the test can fairly reliably detect loans that meet and fail to meet the credit policy. Combined with the high area under the ROC curve value, we can tell that we have a favorable, high arching, ROC curve and model. </a:t>
-            </a:r>
-          </a:p>
-          <a:p>
-            <a:pPr marL="628650" lvl="1" indent="-171450">
+              <a:rPr lang="en-US" sz="800" dirty="0"/>
+              <a:t>So we wanted to do a classification tree for two of</a:t>
+            </a:r>
+            <a:r>
+              <a:rPr lang="en-US" sz="800" baseline="0" dirty="0"/>
+              <a:t> our factor variables to get an understanding of the some of the rules and thresholds underlying our dataset, and test whether this method would prove beneficial for future application</a:t>
+            </a:r>
+          </a:p>
+          <a:p>
+            <a:pPr marL="171450" indent="-171450">
               <a:buFont typeface="Arial" panose="020B0604020202020204" pitchFamily="34" charset="0"/>
               <a:buChar char="•"/>
             </a:pPr>
             <a:r>
-              <a:rPr lang="en-US" dirty="0"/>
-              <a:t>The very high kappa value of .926 suggests there is a high degree of agreement between the predictions and the actual values. </a:t>
-            </a:r>
-          </a:p>
-          <a:p>
-            <a:endParaRPr lang="en-US" dirty="0"/>
-          </a:p>
-          <a:p>
-            <a:endParaRPr lang="en-US" dirty="0"/>
-          </a:p>
-          <a:p>
-            <a:r>
-              <a:rPr lang="en-US" dirty="0"/>
-              <a:t>‘Meets’ is TRUE/POSITIVE, specificity</a:t>
+              <a:rPr lang="en-US" sz="800" baseline="0" dirty="0"/>
+              <a:t>Both variables (credit policy and not fully paid) are binary in nature.</a:t>
+            </a:r>
+            <a:endParaRPr lang="en-US" sz="800" dirty="0"/>
+          </a:p>
+          <a:p>
+            <a:endParaRPr lang="en-US" sz="800" dirty="0"/>
+          </a:p>
+          <a:p>
+            <a:r>
+              <a:rPr lang="en-US" sz="800" u="sng" dirty="0"/>
+              <a:t>Explain tree:</a:t>
+            </a:r>
+          </a:p>
+          <a:p>
+            <a:pPr marL="171450" indent="-171450">
+              <a:buFont typeface="Arial" panose="020B0604020202020204" pitchFamily="34" charset="0"/>
+              <a:buChar char="•"/>
+            </a:pPr>
+            <a:r>
+              <a:rPr lang="en-US" sz="800" dirty="0"/>
+              <a:t>So we did credit policy first. You can see that our tree first split the data by number of inquires in the last 6 months, with the threshold here being greater than or equal to 4. Looking</a:t>
+            </a:r>
+            <a:r>
+              <a:rPr lang="en-US" sz="800" baseline="0" dirty="0"/>
+              <a:t> left, and u</a:t>
+            </a:r>
+            <a:r>
+              <a:rPr lang="en-US" sz="800" dirty="0"/>
+              <a:t>nsurprisingly, loans with four or more inquiries, require a high FICO score to meet the credit policy, with those lower than 740 all</a:t>
+            </a:r>
+            <a:r>
+              <a:rPr lang="en-US" sz="800" baseline="0" dirty="0"/>
+              <a:t> failing to meet the credit policy. </a:t>
+            </a:r>
+            <a:endParaRPr lang="en-US" sz="800" dirty="0"/>
+          </a:p>
+          <a:p>
+            <a:pPr marL="0" indent="0">
+              <a:buFont typeface="Arial" panose="020B0604020202020204" pitchFamily="34" charset="0"/>
+              <a:buNone/>
+            </a:pPr>
+            <a:endParaRPr lang="en-US" sz="800" dirty="0"/>
+          </a:p>
+          <a:p>
+            <a:pPr marL="171450" indent="-171450">
+              <a:buFont typeface="Arial" panose="020B0604020202020204" pitchFamily="34" charset="0"/>
+              <a:buChar char="•"/>
+            </a:pPr>
+            <a:r>
+              <a:rPr lang="en-US" sz="800" dirty="0"/>
+              <a:t>Moving to the right side of the tree</a:t>
+            </a:r>
+            <a:r>
+              <a:rPr lang="en-US" sz="800" baseline="0" dirty="0"/>
+              <a:t> </a:t>
+            </a:r>
+            <a:r>
+              <a:rPr lang="en-US" sz="800" dirty="0"/>
+              <a:t>we can see the difference in the FICO score requirements.</a:t>
+            </a:r>
+            <a:r>
+              <a:rPr lang="en-US" sz="800" baseline="0" dirty="0"/>
+              <a:t> Here, for borrowers with less than 4 inquiries, </a:t>
+            </a:r>
+            <a:r>
+              <a:rPr lang="en-US" sz="800" dirty="0"/>
+              <a:t>a FICO score of only 660</a:t>
+            </a:r>
+            <a:r>
+              <a:rPr lang="en-US" sz="800" baseline="0" dirty="0"/>
+              <a:t> appears to be a general threshold that separates loans that might meet the policy from those who do not. This was an interesting point because these two FICO thresholds tells us that if a loan applicant has a FICO score lower than 660, then they will probably fail to meet the credit policy, regardless of the number of inquiries they had in the past 6 months.</a:t>
+            </a:r>
+          </a:p>
+          <a:p>
+            <a:pPr marL="171450" indent="-171450">
+              <a:buFont typeface="Arial" panose="020B0604020202020204" pitchFamily="34" charset="0"/>
+              <a:buChar char="•"/>
+            </a:pPr>
+            <a:endParaRPr lang="en-US" sz="800" baseline="0" dirty="0"/>
+          </a:p>
+          <a:p>
+            <a:pPr marL="171450" marR="0" lvl="0" indent="-171450" algn="l" defTabSz="914400" rtl="0" eaLnBrk="1" fontAlgn="auto" latinLnBrk="0" hangingPunct="1">
+              <a:lnSpc>
+                <a:spcPct val="100000"/>
+              </a:lnSpc>
+              <a:spcBef>
+                <a:spcPts val="0"/>
+              </a:spcBef>
+              <a:spcAft>
+                <a:spcPts val="0"/>
+              </a:spcAft>
+              <a:buClrTx/>
+              <a:buSzTx/>
+              <a:buFont typeface="Arial" panose="020B0604020202020204" pitchFamily="34" charset="0"/>
+              <a:buChar char="•"/>
+              <a:tabLst/>
+              <a:defRPr/>
+            </a:pPr>
+            <a:r>
+              <a:rPr lang="en-US" sz="800" baseline="0" dirty="0"/>
+              <a:t>Moving further to the bottom right of the tree, we can see that debt-to-income ratios begin to come into play. Loan applicants with less than 4 inquiries and a FICO score better than 660, a debt-to-income ratio of 25 distinguishes between those who generally did not meet the credit policy and those who still might. This was less meaningful to us because those who have 25 times more debt than their income level would not be expected to meet a rational credit policy. </a:t>
+            </a:r>
+          </a:p>
+          <a:p>
+            <a:pPr marL="171450" marR="0" lvl="0" indent="-171450" algn="l" defTabSz="914400" rtl="0" eaLnBrk="1" fontAlgn="auto" latinLnBrk="0" hangingPunct="1">
+              <a:lnSpc>
+                <a:spcPct val="100000"/>
+              </a:lnSpc>
+              <a:spcBef>
+                <a:spcPts val="0"/>
+              </a:spcBef>
+              <a:spcAft>
+                <a:spcPts val="0"/>
+              </a:spcAft>
+              <a:buClrTx/>
+              <a:buSzTx/>
+              <a:buFont typeface="Arial" panose="020B0604020202020204" pitchFamily="34" charset="0"/>
+              <a:buChar char="•"/>
+              <a:tabLst/>
+              <a:defRPr/>
+            </a:pPr>
+            <a:endParaRPr lang="en-US" sz="800" baseline="0" dirty="0"/>
+          </a:p>
+          <a:p>
+            <a:pPr marL="171450" marR="0" lvl="0" indent="-171450" algn="l" defTabSz="914400" rtl="0" eaLnBrk="1" fontAlgn="auto" latinLnBrk="0" hangingPunct="1">
+              <a:lnSpc>
+                <a:spcPct val="100000"/>
+              </a:lnSpc>
+              <a:spcBef>
+                <a:spcPts val="0"/>
+              </a:spcBef>
+              <a:spcAft>
+                <a:spcPts val="0"/>
+              </a:spcAft>
+              <a:buClrTx/>
+              <a:buSzTx/>
+              <a:buFont typeface="Arial" panose="020B0604020202020204" pitchFamily="34" charset="0"/>
+              <a:buChar char="•"/>
+              <a:tabLst/>
+              <a:defRPr/>
+            </a:pPr>
+            <a:r>
+              <a:rPr lang="en-US" sz="800" baseline="0" dirty="0"/>
+              <a:t>So overall, was that loan applicants should have fewer than 4 inquiries from other creditors within the past 6 months, have a reasonable FICO score higher than 660, and should not have an exorbitant amount of debt if they want to anticipate meeting the credit policy.</a:t>
+            </a:r>
+          </a:p>
+          <a:p>
+            <a:endParaRPr lang="en-US" sz="800" dirty="0"/>
+          </a:p>
+          <a:p>
+            <a:r>
+              <a:rPr lang="en-US" sz="800" u="sng" dirty="0"/>
+              <a:t>Confusion Matrix:</a:t>
+            </a:r>
+          </a:p>
+          <a:p>
+            <a:pPr marL="171450" indent="-171450">
+              <a:buFont typeface="Arial" panose="020B0604020202020204" pitchFamily="34" charset="0"/>
+              <a:buChar char="•"/>
+            </a:pPr>
+            <a:r>
+              <a:rPr lang="en-US" sz="800" dirty="0"/>
+              <a:t>We than wanted to check some of the statistics associated with our tree to gauge its reliability and predictability.</a:t>
+            </a:r>
+            <a:r>
+              <a:rPr lang="en-US" sz="800" baseline="0" dirty="0"/>
+              <a:t> </a:t>
+            </a:r>
+            <a:r>
+              <a:rPr lang="en-US" sz="800" dirty="0"/>
+              <a:t>We found most of</a:t>
+            </a:r>
+            <a:r>
+              <a:rPr lang="en-US" sz="800" baseline="0" dirty="0"/>
+              <a:t> them, if not all of them, to be promising. </a:t>
+            </a:r>
+          </a:p>
+          <a:p>
+            <a:pPr marL="628650" marR="0" lvl="1" indent="-171450" algn="l" defTabSz="914400" rtl="0" eaLnBrk="1" fontAlgn="auto" latinLnBrk="0" hangingPunct="1">
+              <a:lnSpc>
+                <a:spcPct val="100000"/>
+              </a:lnSpc>
+              <a:spcBef>
+                <a:spcPts val="0"/>
+              </a:spcBef>
+              <a:spcAft>
+                <a:spcPts val="0"/>
+              </a:spcAft>
+              <a:buClrTx/>
+              <a:buSzTx/>
+              <a:buFont typeface="Arial" panose="020B0604020202020204" pitchFamily="34" charset="0"/>
+              <a:buChar char="•"/>
+              <a:tabLst/>
+              <a:defRPr/>
+            </a:pPr>
+            <a:r>
+              <a:rPr lang="en-US" sz="800" baseline="0" dirty="0"/>
+              <a:t>The </a:t>
+            </a:r>
+            <a:r>
+              <a:rPr lang="en-US" sz="800" dirty="0"/>
+              <a:t>sensitivity and specificity values indicate the test can fairly reliably detect loans that meet and fail to meet the credit policy. We can also tell that we have a favorable, high arching, ROC curve after</a:t>
+            </a:r>
+            <a:r>
+              <a:rPr lang="en-US" sz="800" baseline="0" dirty="0"/>
+              <a:t> looking at the these values along with </a:t>
+            </a:r>
+            <a:r>
+              <a:rPr lang="en-US" sz="800" baseline="0" dirty="0" err="1"/>
+              <a:t>with</a:t>
+            </a:r>
+            <a:r>
+              <a:rPr lang="en-US" sz="800" baseline="0" dirty="0"/>
+              <a:t> the AUC. </a:t>
+            </a:r>
+            <a:endParaRPr lang="en-US" sz="800" dirty="0"/>
+          </a:p>
+          <a:p>
+            <a:pPr marL="628650" marR="0" lvl="1" indent="-171450" algn="l" defTabSz="914400" rtl="0" eaLnBrk="1" fontAlgn="auto" latinLnBrk="0" hangingPunct="1">
+              <a:lnSpc>
+                <a:spcPct val="100000"/>
+              </a:lnSpc>
+              <a:spcBef>
+                <a:spcPts val="0"/>
+              </a:spcBef>
+              <a:spcAft>
+                <a:spcPts val="0"/>
+              </a:spcAft>
+              <a:buClrTx/>
+              <a:buSzTx/>
+              <a:buFont typeface="Arial" panose="020B0604020202020204" pitchFamily="34" charset="0"/>
+              <a:buChar char="•"/>
+              <a:tabLst/>
+              <a:defRPr/>
+            </a:pPr>
+            <a:r>
+              <a:rPr lang="en-US" sz="800" dirty="0"/>
+              <a:t>The high precision indicates the tree is very good identifying true positives, in that 99.6%</a:t>
+            </a:r>
+            <a:r>
+              <a:rPr lang="en-US" sz="800" baseline="0" dirty="0"/>
+              <a:t> of its predicted fails were right.</a:t>
+            </a:r>
+          </a:p>
+          <a:p>
+            <a:pPr marL="628650" marR="0" lvl="1" indent="-171450" algn="l" defTabSz="914400" rtl="0" eaLnBrk="1" fontAlgn="auto" latinLnBrk="0" hangingPunct="1">
+              <a:lnSpc>
+                <a:spcPct val="100000"/>
+              </a:lnSpc>
+              <a:spcBef>
+                <a:spcPts val="0"/>
+              </a:spcBef>
+              <a:spcAft>
+                <a:spcPts val="0"/>
+              </a:spcAft>
+              <a:buClrTx/>
+              <a:buSzTx/>
+              <a:buFont typeface="Arial" panose="020B0604020202020204" pitchFamily="34" charset="0"/>
+              <a:buChar char="•"/>
+              <a:tabLst/>
+              <a:defRPr/>
+            </a:pPr>
+            <a:r>
+              <a:rPr lang="en-US" sz="800" dirty="0"/>
+              <a:t>The high kappa value of .859 suggests there is a high degree of agreement between the predictions and the actual values.</a:t>
+            </a:r>
+          </a:p>
+          <a:p>
+            <a:pPr marL="628650" marR="0" lvl="1" indent="-171450" algn="l" defTabSz="914400" rtl="0" eaLnBrk="1" fontAlgn="auto" latinLnBrk="0" hangingPunct="1">
+              <a:lnSpc>
+                <a:spcPct val="100000"/>
+              </a:lnSpc>
+              <a:spcBef>
+                <a:spcPts val="0"/>
+              </a:spcBef>
+              <a:spcAft>
+                <a:spcPts val="0"/>
+              </a:spcAft>
+              <a:buClrTx/>
+              <a:buSzTx/>
+              <a:buFont typeface="Arial" panose="020B0604020202020204" pitchFamily="34" charset="0"/>
+              <a:buChar char="•"/>
+              <a:tabLst/>
+              <a:defRPr/>
+            </a:pPr>
+            <a:endParaRPr lang="en-US" sz="800" dirty="0"/>
+          </a:p>
+          <a:p>
+            <a:pPr marL="171450" marR="0" lvl="0" indent="-171450" algn="l" defTabSz="914400" rtl="0" eaLnBrk="1" fontAlgn="auto" latinLnBrk="0" hangingPunct="1">
+              <a:lnSpc>
+                <a:spcPct val="100000"/>
+              </a:lnSpc>
+              <a:spcBef>
+                <a:spcPts val="0"/>
+              </a:spcBef>
+              <a:spcAft>
+                <a:spcPts val="0"/>
+              </a:spcAft>
+              <a:buClrTx/>
+              <a:buSzTx/>
+              <a:buFont typeface="Arial" panose="020B0604020202020204" pitchFamily="34" charset="0"/>
+              <a:buChar char="•"/>
+              <a:tabLst/>
+              <a:defRPr/>
+            </a:pPr>
+            <a:r>
+              <a:rPr lang="en-US" sz="800" dirty="0"/>
+              <a:t>At the end here, we just sort of contextualize some of the stats we just discussed. You can see our tree predicted 1483 loans</a:t>
+            </a:r>
+            <a:r>
+              <a:rPr lang="en-US" sz="800" baseline="0" dirty="0"/>
+              <a:t> to fail to meet the credit policy while 1868 actually did. And it predicted 7704 loans to meet the credit policy while 7710 actually did. </a:t>
+            </a:r>
+          </a:p>
+          <a:p>
+            <a:pPr marL="628650" marR="0" lvl="1" indent="-171450" algn="l" defTabSz="914400" rtl="0" eaLnBrk="1" fontAlgn="auto" latinLnBrk="0" hangingPunct="1">
+              <a:lnSpc>
+                <a:spcPct val="100000"/>
+              </a:lnSpc>
+              <a:spcBef>
+                <a:spcPts val="0"/>
+              </a:spcBef>
+              <a:spcAft>
+                <a:spcPts val="0"/>
+              </a:spcAft>
+              <a:buClrTx/>
+              <a:buSzTx/>
+              <a:buFont typeface="Arial" panose="020B0604020202020204" pitchFamily="34" charset="0"/>
+              <a:buChar char="•"/>
+              <a:tabLst/>
+              <a:defRPr/>
+            </a:pPr>
+            <a:r>
+              <a:rPr lang="en-US" sz="800" baseline="0" dirty="0"/>
+              <a:t>IF ASKED: these predicted amounts exclude false positives and false negatives.</a:t>
+            </a:r>
+          </a:p>
+          <a:p>
+            <a:pPr marL="628650" marR="0" lvl="1" indent="-171450" algn="l" defTabSz="914400" rtl="0" eaLnBrk="1" fontAlgn="auto" latinLnBrk="0" hangingPunct="1">
+              <a:lnSpc>
+                <a:spcPct val="100000"/>
+              </a:lnSpc>
+              <a:spcBef>
+                <a:spcPts val="0"/>
+              </a:spcBef>
+              <a:spcAft>
+                <a:spcPts val="0"/>
+              </a:spcAft>
+              <a:buClrTx/>
+              <a:buSzTx/>
+              <a:buFont typeface="Arial" panose="020B0604020202020204" pitchFamily="34" charset="0"/>
+              <a:buChar char="•"/>
+              <a:tabLst/>
+              <a:defRPr/>
+            </a:pPr>
+            <a:endParaRPr lang="en-US" sz="800" dirty="0"/>
+          </a:p>
+          <a:p>
+            <a:pPr marL="171450" indent="-171450">
+              <a:buFont typeface="Arial" panose="020B0604020202020204" pitchFamily="34" charset="0"/>
+              <a:buChar char="•"/>
+            </a:pPr>
+            <a:r>
+              <a:rPr lang="en-US" sz="800" dirty="0"/>
+              <a:t>The true negatives are those who met the credit policy</a:t>
+            </a:r>
+          </a:p>
+          <a:p>
+            <a:pPr marL="171450" indent="-171450">
+              <a:buFont typeface="Arial" panose="020B0604020202020204" pitchFamily="34" charset="0"/>
+              <a:buChar char="•"/>
+            </a:pPr>
+            <a:r>
+              <a:rPr lang="en-US" sz="800" dirty="0"/>
+              <a:t>The true positives are those who failed to meet the credit policy</a:t>
+            </a:r>
+          </a:p>
+          <a:p>
+            <a:endParaRPr lang="en-US" sz="800" dirty="0"/>
+          </a:p>
+          <a:p>
+            <a:r>
+              <a:rPr lang="en-US" sz="800" u="sng" dirty="0"/>
+              <a:t>ADMIN:</a:t>
             </a:r>
           </a:p>
           <a:p>
@@ -1486,7 +1822,7 @@
               <a:buChar char="•"/>
             </a:pPr>
             <a:r>
-              <a:rPr lang="en-US" b="1" i="0" dirty="0">
+              <a:rPr lang="en-US" sz="800" b="1" i="0" dirty="0">
                 <a:solidFill>
                   <a:srgbClr val="202122"/>
                 </a:solidFill>
@@ -1496,7 +1832,7 @@
               <a:t>Sensitivity</a:t>
             </a:r>
             <a:r>
-              <a:rPr lang="en-US" b="0" i="0" dirty="0">
+              <a:rPr lang="en-US" sz="800" b="0" i="0" dirty="0">
                 <a:solidFill>
                   <a:srgbClr val="202122"/>
                 </a:solidFill>
@@ -1512,7 +1848,7 @@
               <a:buChar char="•"/>
             </a:pPr>
             <a:r>
-              <a:rPr lang="en-US" b="1" i="0" dirty="0">
+              <a:rPr lang="en-US" sz="800" b="1" i="0" dirty="0">
                 <a:solidFill>
                   <a:srgbClr val="202122"/>
                 </a:solidFill>
@@ -1522,7 +1858,7 @@
               <a:t>Specificity</a:t>
             </a:r>
             <a:r>
-              <a:rPr lang="en-US" b="0" i="0" dirty="0">
+              <a:rPr lang="en-US" sz="800" b="0" i="0" dirty="0">
                 <a:solidFill>
                   <a:srgbClr val="202122"/>
                 </a:solidFill>
@@ -1531,7 +1867,7 @@
               </a:rPr>
               <a:t> (true negative rate; x-axis) refers to the probability of a negative test, conditioned on truly being negative.</a:t>
             </a:r>
-            <a:endParaRPr lang="en-US" b="0" i="0" dirty="0">
+            <a:endParaRPr lang="en-US" sz="800" b="0" i="0" dirty="0">
               <a:solidFill>
                 <a:schemeClr val="tx1"/>
               </a:solidFill>
@@ -1545,7 +1881,7 @@
               <a:buChar char="•"/>
             </a:pPr>
             <a:r>
-              <a:rPr lang="en-US" b="1" i="0" dirty="0">
+              <a:rPr lang="en-US" sz="800" b="1" i="0" dirty="0">
                 <a:solidFill>
                   <a:srgbClr val="202122"/>
                 </a:solidFill>
@@ -1555,7 +1891,7 @@
               <a:t>Kappa</a:t>
             </a:r>
             <a:r>
-              <a:rPr lang="en-US" b="0" i="0" dirty="0">
+              <a:rPr lang="en-US" sz="800" b="0" i="0" dirty="0">
                 <a:solidFill>
                   <a:srgbClr val="202122"/>
                 </a:solidFill>
@@ -1565,12 +1901,12 @@
               <a:t> </a:t>
             </a:r>
             <a:r>
-              <a:rPr lang="en-US" dirty="0"/>
+              <a:rPr lang="en-US" sz="800" dirty="0"/>
               <a:t>coefficient measures the agreement between classification and truth values. A kappa value of 1 represents perfect agreement, while a value of 0 represents no agreement.</a:t>
             </a:r>
           </a:p>
           <a:p>
-            <a:endParaRPr lang="en-US" b="1" dirty="0"/>
+            <a:endParaRPr lang="en-US" sz="800" b="1" dirty="0"/>
           </a:p>
           <a:p>
             <a:pPr algn="l">
@@ -1578,21 +1914,21 @@
               <a:buChar char="•"/>
             </a:pPr>
             <a:r>
-              <a:rPr lang="en-US" b="1" i="0" dirty="0" err="1">
+              <a:rPr lang="en-US" sz="800" b="1" i="0" dirty="0" err="1">
                 <a:effectLst/>
                 <a:latin typeface="Inter"/>
               </a:rPr>
               <a:t>credit.policy</a:t>
             </a:r>
             <a:r>
-              <a:rPr lang="en-US" b="1" i="0" dirty="0">
+              <a:rPr lang="en-US" sz="800" b="1" i="0" dirty="0">
                 <a:effectLst/>
                 <a:latin typeface="Inter"/>
               </a:rPr>
               <a:t>: </a:t>
             </a:r>
             <a:r>
-              <a:rPr lang="en-US" b="0" i="0" dirty="0">
+              <a:rPr lang="en-US" sz="800" b="0" i="0" dirty="0">
                 <a:effectLst/>
                 <a:latin typeface="Inter"/>
               </a:rPr>
@@ -1618,14 +1954,14 @@
               <a:defRPr/>
             </a:pPr>
             <a:r>
-              <a:rPr lang="en-US" b="1" i="0" dirty="0">
+              <a:rPr lang="en-US" sz="800" b="1" i="0" dirty="0">
                 <a:effectLst/>
                 <a:latin typeface="Inter"/>
               </a:rPr>
               <a:t>inq.last.6mths:</a:t>
             </a:r>
             <a:r>
-              <a:rPr lang="en-US" b="0" i="0" dirty="0">
+              <a:rPr lang="en-US" sz="800" b="0" i="0" dirty="0">
                 <a:effectLst/>
                 <a:latin typeface="Inter"/>
               </a:rPr>
@@ -1651,14 +1987,14 @@
               <a:defRPr/>
             </a:pPr>
             <a:r>
-              <a:rPr lang="en-US" b="1" i="0" dirty="0">
+              <a:rPr lang="en-US" sz="800" b="1" i="0" dirty="0">
                 <a:effectLst/>
                 <a:latin typeface="Inter"/>
               </a:rPr>
               <a:t>fico: </a:t>
             </a:r>
             <a:r>
-              <a:rPr lang="en-US" b="0" i="0" dirty="0">
+              <a:rPr lang="en-US" sz="800" b="0" i="0" dirty="0">
                 <a:effectLst/>
                 <a:latin typeface="Inter"/>
               </a:rPr>
@@ -1684,25 +2020,230 @@
               <a:defRPr/>
             </a:pPr>
             <a:r>
-              <a:rPr lang="en-US" b="1" i="0" dirty="0" err="1">
+              <a:rPr lang="en-US" sz="800" b="1" i="0" dirty="0" err="1">
+                <a:effectLst/>
+                <a:latin typeface="Inter"/>
+              </a:rPr>
+              <a:t>dti</a:t>
+            </a:r>
+            <a:r>
+              <a:rPr lang="en-US" sz="800" b="1" i="0" dirty="0">
+                <a:effectLst/>
+                <a:latin typeface="Inter"/>
+              </a:rPr>
+              <a:t>: </a:t>
+            </a:r>
+            <a:r>
+              <a:rPr lang="en-US" sz="800" b="0" i="0" dirty="0">
+                <a:effectLst/>
+                <a:latin typeface="Inter"/>
+              </a:rPr>
+              <a:t>The debt-to-income ratio of the borrower (amount of debt divided by annual income).</a:t>
+            </a:r>
+          </a:p>
+          <a:p>
+            <a:endParaRPr lang="en-US" sz="800" dirty="0"/>
+          </a:p>
+          <a:p>
+            <a:pPr algn="l">
+              <a:buFont typeface="Arial" panose="020B0604020202020204" pitchFamily="34" charset="0"/>
+              <a:buChar char="•"/>
+            </a:pPr>
+            <a:r>
+              <a:rPr lang="en-US" sz="800" b="0" i="0" dirty="0" err="1">
+                <a:effectLst/>
+                <a:latin typeface="Inter"/>
+              </a:rPr>
+              <a:t>credit.policy</a:t>
+            </a:r>
+            <a:r>
+              <a:rPr lang="en-US" sz="800" b="0" i="0" dirty="0">
+                <a:effectLst/>
+                <a:latin typeface="Inter"/>
+              </a:rPr>
+              <a:t>: 1 if the customer meets the credit underwriting criteria of LendingClub.com, and 0 otherwise.</a:t>
+            </a:r>
+          </a:p>
+          <a:p>
+            <a:pPr algn="l">
+              <a:buFont typeface="Arial" panose="020B0604020202020204" pitchFamily="34" charset="0"/>
+              <a:buChar char="•"/>
+            </a:pPr>
+            <a:r>
+              <a:rPr lang="en-US" sz="800" b="0" i="0" dirty="0">
+                <a:effectLst/>
+                <a:latin typeface="Inter"/>
+              </a:rPr>
+              <a:t>purpose: The purpose of the loan (takes values "</a:t>
+            </a:r>
+            <a:r>
+              <a:rPr lang="en-US" sz="800" b="0" i="0" dirty="0" err="1">
+                <a:effectLst/>
+                <a:latin typeface="Inter"/>
+              </a:rPr>
+              <a:t>credit_card</a:t>
+            </a:r>
+            <a:r>
+              <a:rPr lang="en-US" sz="800" b="0" i="0" dirty="0">
+                <a:effectLst/>
+                <a:latin typeface="Inter"/>
+              </a:rPr>
+              <a:t>", "</a:t>
+            </a:r>
+            <a:r>
+              <a:rPr lang="en-US" sz="800" b="0" i="0" dirty="0" err="1">
+                <a:effectLst/>
+                <a:latin typeface="Inter"/>
+              </a:rPr>
+              <a:t>debt_consolidation</a:t>
+            </a:r>
+            <a:r>
+              <a:rPr lang="en-US" sz="800" b="0" i="0" dirty="0">
+                <a:effectLst/>
+                <a:latin typeface="Inter"/>
+              </a:rPr>
+              <a:t>", "educational", "</a:t>
+            </a:r>
+            <a:r>
+              <a:rPr lang="en-US" sz="800" b="0" i="0" dirty="0" err="1">
+                <a:effectLst/>
+                <a:latin typeface="Inter"/>
+              </a:rPr>
+              <a:t>major_purchase</a:t>
+            </a:r>
+            <a:r>
+              <a:rPr lang="en-US" sz="800" b="0" i="0" dirty="0">
+                <a:effectLst/>
+                <a:latin typeface="Inter"/>
+              </a:rPr>
+              <a:t>", "</a:t>
+            </a:r>
+            <a:r>
+              <a:rPr lang="en-US" sz="800" b="0" i="0" dirty="0" err="1">
+                <a:effectLst/>
+                <a:latin typeface="Inter"/>
+              </a:rPr>
+              <a:t>small_business</a:t>
+            </a:r>
+            <a:r>
+              <a:rPr lang="en-US" sz="800" b="0" i="0" dirty="0">
+                <a:effectLst/>
+                <a:latin typeface="Inter"/>
+              </a:rPr>
+              <a:t>", and "</a:t>
+            </a:r>
+            <a:r>
+              <a:rPr lang="en-US" sz="800" b="0" i="0" dirty="0" err="1">
+                <a:effectLst/>
+                <a:latin typeface="Inter"/>
+              </a:rPr>
+              <a:t>all_other</a:t>
+            </a:r>
+            <a:r>
+              <a:rPr lang="en-US" sz="800" b="0" i="0" dirty="0">
+                <a:effectLst/>
+                <a:latin typeface="Inter"/>
+              </a:rPr>
+              <a:t>").</a:t>
+            </a:r>
+          </a:p>
+          <a:p>
+            <a:pPr algn="l">
+              <a:buFont typeface="Arial" panose="020B0604020202020204" pitchFamily="34" charset="0"/>
+              <a:buChar char="•"/>
+            </a:pPr>
+            <a:r>
+              <a:rPr lang="en-US" sz="800" b="0" i="0" dirty="0" err="1">
+                <a:effectLst/>
+                <a:latin typeface="Inter"/>
+              </a:rPr>
+              <a:t>int.rate</a:t>
+            </a:r>
+            <a:r>
+              <a:rPr lang="en-US" sz="800" b="0" i="0" dirty="0">
+                <a:effectLst/>
+                <a:latin typeface="Inter"/>
+              </a:rPr>
+              <a:t>: The interest rate of the loan, as a proportion (a rate of 11% would be stored as 0.11). Borrowers judged by LendingClub.com to be more risky are assigned higher interest rates.</a:t>
+            </a:r>
+          </a:p>
+          <a:p>
+            <a:pPr algn="l">
+              <a:buFont typeface="Arial" panose="020B0604020202020204" pitchFamily="34" charset="0"/>
+              <a:buChar char="•"/>
+            </a:pPr>
+            <a:r>
+              <a:rPr lang="en-US" sz="800" b="0" i="0" dirty="0">
+                <a:effectLst/>
+                <a:latin typeface="Inter"/>
+              </a:rPr>
+              <a:t>installment: The monthly installments owed by the borrower if the loan is funded.</a:t>
+            </a:r>
+          </a:p>
+          <a:p>
+            <a:pPr algn="l">
+              <a:buFont typeface="Arial" panose="020B0604020202020204" pitchFamily="34" charset="0"/>
+              <a:buChar char="•"/>
+            </a:pPr>
+            <a:r>
+              <a:rPr lang="en-US" sz="800" b="0" i="0" dirty="0">
+                <a:effectLst/>
+                <a:latin typeface="Inter"/>
+              </a:rPr>
+              <a:t>log.annual.inc: The natural log of the self-reported annual income of the borrower.</a:t>
+            </a:r>
+          </a:p>
+          <a:p>
+            <a:pPr algn="l">
+              <a:buFont typeface="Arial" panose="020B0604020202020204" pitchFamily="34" charset="0"/>
+              <a:buChar char="•"/>
+            </a:pPr>
+            <a:r>
+              <a:rPr lang="en-US" sz="800" b="0" i="0" dirty="0" err="1">
+                <a:effectLst/>
+                <a:latin typeface="Inter"/>
+              </a:rPr>
+              <a:t>dti</a:t>
+            </a:r>
+            <a:r>
+              <a:rPr lang="en-US" sz="800" b="0" i="0" dirty="0">
+                <a:effectLst/>
+                <a:latin typeface="Inter"/>
+              </a:rPr>
+              <a:t>: The debt-to-income ratio of the borrower (amount of debt divided by annual income).</a:t>
+            </a:r>
+          </a:p>
+          <a:p>
+            <a:pPr algn="l">
+              <a:buFont typeface="Arial" panose="020B0604020202020204" pitchFamily="34" charset="0"/>
+              <a:buChar char="•"/>
+            </a:pPr>
+            <a:r>
+              <a:rPr lang="en-US" sz="800" b="0" i="0" dirty="0">
+                <a:effectLst/>
+                <a:latin typeface="Inter"/>
+              </a:rPr>
+              <a:t>fico: The FICO credit score of the borrower.</a:t>
+            </a:r>
+          </a:p>
+          <a:p>
+            <a:pPr algn="l">
+              <a:buFont typeface="Arial" panose="020B0604020202020204" pitchFamily="34" charset="0"/>
+              <a:buChar char="•"/>
+            </a:pPr>
+            <a:r>
+              <a:rPr lang="en-US" sz="800" b="0" i="0" dirty="0" err="1">
                 <a:effectLst/>
                 <a:latin typeface="Inter"/>
               </a:rPr>
               <a:t>days.with.cr.line</a:t>
             </a:r>
             <a:r>
-              <a:rPr lang="en-US" b="1" i="0" dirty="0">
+              <a:rPr lang="en-US" sz="800" b="0" i="0" dirty="0">
                 <a:effectLst/>
                 <a:latin typeface="Inter"/>
               </a:rPr>
-              <a:t>: </a:t>
-            </a:r>
-            <a:r>
-              <a:rPr lang="en-US" b="0" i="0" dirty="0">
-                <a:effectLst/>
-                <a:latin typeface="Inter"/>
-              </a:rPr>
-              <a:t>The number of days the borrower has had a credit line.</a:t>
+              <a:t>: The number of days the borrower has had a credit line.</a:t>
             </a:r>
           </a:p>
           <a:p>
@@ -1711,29 +2252,85 @@
               <a:buChar char="•"/>
             </a:pPr>
             <a:r>
-              <a:rPr lang="en-US" b="1" i="0" dirty="0" err="1">
+              <a:rPr lang="en-US" sz="800" b="0" i="0" dirty="0" err="1">
                 <a:effectLst/>
                 <a:latin typeface="Inter"/>
               </a:rPr>
               <a:t>revol.bal</a:t>
             </a:r>
             <a:r>
-              <a:rPr lang="en-US" b="1" i="0" dirty="0">
+              <a:rPr lang="en-US" sz="800" b="0" i="0" dirty="0">
                 <a:effectLst/>
                 <a:latin typeface="Inter"/>
               </a:rPr>
-              <a:t>:</a:t>
-            </a:r>
-            <a:r>
-              <a:rPr lang="en-US" b="0" i="0" dirty="0">
+              <a:t>: The borrower's revolving balance (amount unpaid at the end of the credit card billing cycle).</a:t>
+            </a:r>
+          </a:p>
+          <a:p>
+            <a:pPr algn="l">
+              <a:buFont typeface="Arial" panose="020B0604020202020204" pitchFamily="34" charset="0"/>
+              <a:buChar char="•"/>
+            </a:pPr>
+            <a:r>
+              <a:rPr lang="en-US" sz="800" b="0" i="0" dirty="0" err="1">
                 <a:effectLst/>
                 <a:latin typeface="Inter"/>
               </a:rPr>
-              <a:t> The borrower's revolving balance (amount unpaid at the end of the credit card billing cycle).</a:t>
-            </a:r>
-          </a:p>
-          <a:p>
-            <a:endParaRPr lang="en-US" dirty="0"/>
+              <a:t>revol.util</a:t>
+            </a:r>
+            <a:r>
+              <a:rPr lang="en-US" sz="800" b="0" i="0" dirty="0">
+                <a:effectLst/>
+                <a:latin typeface="Inter"/>
+              </a:rPr>
+              <a:t>: The borrower's revolving line utilization rate (the amount of the credit line used relative to total credit available).</a:t>
+            </a:r>
+          </a:p>
+          <a:p>
+            <a:pPr algn="l">
+              <a:buFont typeface="Arial" panose="020B0604020202020204" pitchFamily="34" charset="0"/>
+              <a:buChar char="•"/>
+            </a:pPr>
+            <a:r>
+              <a:rPr lang="en-US" sz="800" b="0" i="0" dirty="0">
+                <a:effectLst/>
+                <a:latin typeface="Inter"/>
+              </a:rPr>
+              <a:t>inq.last.6mths: The borrower's number of inquiries by creditors in the last 6 months.</a:t>
+            </a:r>
+          </a:p>
+          <a:p>
+            <a:pPr algn="l">
+              <a:buFont typeface="Arial" panose="020B0604020202020204" pitchFamily="34" charset="0"/>
+              <a:buChar char="•"/>
+            </a:pPr>
+            <a:r>
+              <a:rPr lang="en-US" sz="800" b="0" i="0" dirty="0">
+                <a:effectLst/>
+                <a:latin typeface="Inter"/>
+              </a:rPr>
+              <a:t>delinq.2yrs: The number of times the borrower had been 30+ days past due on a payment in the past 2 years.</a:t>
+            </a:r>
+          </a:p>
+          <a:p>
+            <a:pPr algn="l">
+              <a:buFont typeface="Arial" panose="020B0604020202020204" pitchFamily="34" charset="0"/>
+              <a:buChar char="•"/>
+            </a:pPr>
+            <a:r>
+              <a:rPr lang="en-US" sz="800" b="0" i="0" dirty="0" err="1">
+                <a:effectLst/>
+                <a:latin typeface="Inter"/>
+              </a:rPr>
+              <a:t>pub.rec</a:t>
+            </a:r>
+            <a:r>
+              <a:rPr lang="en-US" sz="800" b="0" i="0" dirty="0">
+                <a:effectLst/>
+                <a:latin typeface="Inter"/>
+              </a:rPr>
+              <a:t>: The borrower's number of derogatory public records (bankruptcy filings, tax liens, or judgments).</a:t>
+            </a:r>
           </a:p>
         </p:txBody>
       </p:sp>
@@ -1818,63 +2415,8 @@
           <a:lstStyle/>
           <a:p>
             <a:r>
-              <a:rPr lang="en-US" dirty="0"/>
-              <a:t>Explain tree:</a:t>
-            </a:r>
-          </a:p>
-          <a:p>
-            <a:r>
-              <a:rPr lang="en-US" dirty="0"/>
-              <a:t>Our initial classification tree revealed in no chosen variables and only the single root node, a kappa value of 0, and a ROC curve that fit directly on the random classifier line. We interpreted this as a strong indicator that a classification tree would not be useful for the `</a:t>
-            </a:r>
-            <a:r>
-              <a:rPr lang="en-US" dirty="0" err="1"/>
-              <a:t>not.fully.paid</a:t>
-            </a:r>
-            <a:r>
-              <a:rPr lang="en-US" dirty="0"/>
-              <a:t>` variable. To confirm this indication, we overrode the default complexity parameter in the </a:t>
-            </a:r>
-            <a:r>
-              <a:rPr lang="en-US" dirty="0" err="1"/>
-              <a:t>rPart</a:t>
-            </a:r>
-            <a:r>
-              <a:rPr lang="en-US" dirty="0"/>
-              <a:t> function and set it from .01 to .001. By reducing that value in R, we reduce the minimum improvement amount that is required at each node for a split to occur during the tree’s configuration; i.e., we are essentially lowering the restriction on how and when the tree is constructed. </a:t>
-            </a:r>
-          </a:p>
-          <a:p>
-            <a:endParaRPr lang="en-US" dirty="0"/>
-          </a:p>
-          <a:p>
-            <a:r>
-              <a:rPr lang="en-US" dirty="0"/>
-              <a:t>This led to the classification tree using the variables `</a:t>
-            </a:r>
-            <a:r>
-              <a:rPr lang="en-US" dirty="0" err="1"/>
-              <a:t>credit.policy</a:t>
-            </a:r>
-            <a:r>
-              <a:rPr lang="en-US" dirty="0"/>
-              <a:t>`, `inq.last.6mths`, `</a:t>
-            </a:r>
-            <a:r>
-              <a:rPr lang="en-US" dirty="0" err="1"/>
-              <a:t>int.rate</a:t>
-            </a:r>
-            <a:r>
-              <a:rPr lang="en-US" dirty="0"/>
-              <a:t>`, and `purpose` in building the tree. Looking at it though, and with our initially suspicion regarding the usefulness of the tree, we can see that it is not very informative. We can see that the majority of loans that met the </a:t>
-            </a:r>
-            <a:r>
-              <a:rPr lang="en-US" dirty="0" err="1"/>
-              <a:t>credit.policy</a:t>
-            </a:r>
-            <a:r>
-              <a:rPr lang="en-US" dirty="0"/>
-              <a:t>, paid the loan, which we would generally expect. We can also see that that those loans that did not meet the credit policy, had higher a number of inquiries in the last 6 months, and higher interest rates, would probably more susceptible of going Unpaid; this is also what we would generally expect to see. </a:t>
+              <a:rPr lang="en-US" u="sng" dirty="0"/>
+              <a:t>Intro:</a:t>
             </a:r>
           </a:p>
           <a:p>
@@ -1884,6 +2426,172 @@
             </a:pPr>
             <a:r>
               <a:rPr lang="en-US" dirty="0"/>
+              <a:t>So then we wanted to a similar tree for our not fully paid variable.</a:t>
+            </a:r>
+            <a:r>
+              <a:rPr lang="en-US" baseline="0" dirty="0"/>
+              <a:t> </a:t>
+            </a:r>
+          </a:p>
+          <a:p>
+            <a:pPr marL="171450" indent="-171450">
+              <a:buFont typeface="Arial" panose="020B0604020202020204" pitchFamily="34" charset="0"/>
+              <a:buChar char="•"/>
+            </a:pPr>
+            <a:r>
+              <a:rPr lang="en-US" dirty="0"/>
+              <a:t>Initially,</a:t>
+            </a:r>
+            <a:r>
+              <a:rPr lang="en-US" baseline="0" dirty="0"/>
+              <a:t> the </a:t>
+            </a:r>
+            <a:r>
+              <a:rPr lang="en-US" dirty="0"/>
+              <a:t>classification tree revealed in no chosen variables and only the single root node, a kappa value of 0, and a ROC curve that fit directly on the random classifier line. We interpreted this as a strong indicator that a classification tree would not be useful for the not</a:t>
+            </a:r>
+            <a:r>
+              <a:rPr lang="en-US" baseline="0" dirty="0"/>
+              <a:t> </a:t>
+            </a:r>
+            <a:r>
+              <a:rPr lang="en-US" dirty="0"/>
+              <a:t>fully</a:t>
+            </a:r>
+            <a:r>
+              <a:rPr lang="en-US" baseline="0" dirty="0"/>
+              <a:t> </a:t>
+            </a:r>
+            <a:r>
+              <a:rPr lang="en-US" dirty="0"/>
+              <a:t>paid variable.</a:t>
+            </a:r>
+          </a:p>
+          <a:p>
+            <a:pPr marL="171450" indent="-171450">
+              <a:buFont typeface="Arial" panose="020B0604020202020204" pitchFamily="34" charset="0"/>
+              <a:buChar char="•"/>
+            </a:pPr>
+            <a:r>
+              <a:rPr lang="en-US" dirty="0"/>
+              <a:t>To confirm or corroborate</a:t>
+            </a:r>
+            <a:r>
+              <a:rPr lang="en-US" baseline="0" dirty="0"/>
+              <a:t> that indicator, </a:t>
+            </a:r>
+            <a:r>
+              <a:rPr lang="en-US" dirty="0"/>
+              <a:t>we overrode the default complexity parameter in the </a:t>
+            </a:r>
+            <a:r>
+              <a:rPr lang="en-US" dirty="0" err="1"/>
+              <a:t>rPart</a:t>
+            </a:r>
+            <a:r>
+              <a:rPr lang="en-US" dirty="0"/>
+              <a:t> function and lowered it from .01 to .001. By reducing that value in the R code, we reduce the minimum improvement amount that is required at each node for a split to occur during the tree’s configuration. In other word,</a:t>
+            </a:r>
+            <a:r>
+              <a:rPr lang="en-US" baseline="0" dirty="0"/>
+              <a:t> we </a:t>
+            </a:r>
+            <a:r>
+              <a:rPr lang="en-US" dirty="0"/>
+              <a:t>essentially lowered the restriction on how and when the tree is constructed. As you can probably</a:t>
+            </a:r>
+            <a:r>
+              <a:rPr lang="en-US" baseline="0" dirty="0"/>
+              <a:t> imagine, this could yield a less meaningful tree.</a:t>
+            </a:r>
+            <a:endParaRPr lang="en-US" dirty="0"/>
+          </a:p>
+          <a:p>
+            <a:endParaRPr lang="en-US" dirty="0"/>
+          </a:p>
+          <a:p>
+            <a:r>
+              <a:rPr lang="en-US" u="sng" dirty="0"/>
+              <a:t>Explain tree:</a:t>
+            </a:r>
+          </a:p>
+          <a:p>
+            <a:pPr marL="171450" indent="-171450">
+              <a:buFont typeface="Arial" panose="020B0604020202020204" pitchFamily="34" charset="0"/>
+              <a:buChar char="•"/>
+            </a:pPr>
+            <a:r>
+              <a:rPr lang="en-US" dirty="0"/>
+              <a:t>By</a:t>
+            </a:r>
+            <a:r>
+              <a:rPr lang="en-US" baseline="0" dirty="0"/>
+              <a:t> reducing the complexity parameter to .001, we were able to force the classification tree to split more; in this case by the ‘</a:t>
+            </a:r>
+            <a:r>
+              <a:rPr lang="en-US" dirty="0" err="1"/>
+              <a:t>credit.policy</a:t>
+            </a:r>
+            <a:r>
+              <a:rPr lang="en-US" dirty="0"/>
+              <a:t>`, `inq.last.6mths`, `</a:t>
+            </a:r>
+            <a:r>
+              <a:rPr lang="en-US" dirty="0" err="1"/>
+              <a:t>int.rate</a:t>
+            </a:r>
+            <a:r>
+              <a:rPr lang="en-US" dirty="0"/>
+              <a:t>`, and `purpose`. Looking at it though, and in line with our</a:t>
+            </a:r>
+            <a:r>
+              <a:rPr lang="en-US" baseline="0" dirty="0"/>
+              <a:t> expectations, </a:t>
+            </a:r>
+            <a:r>
+              <a:rPr lang="en-US" dirty="0"/>
+              <a:t>we can see that it is not very informative. </a:t>
+            </a:r>
+            <a:r>
+              <a:rPr lang="en-US" baseline="0" dirty="0"/>
+              <a:t> </a:t>
+            </a:r>
+          </a:p>
+          <a:p>
+            <a:pPr marL="171450" indent="-171450">
+              <a:buFont typeface="Arial" panose="020B0604020202020204" pitchFamily="34" charset="0"/>
+              <a:buChar char="•"/>
+            </a:pPr>
+            <a:r>
+              <a:rPr lang="en-US" dirty="0"/>
+              <a:t>The majority of loans that met the </a:t>
+            </a:r>
+            <a:r>
+              <a:rPr lang="en-US" dirty="0" err="1"/>
+              <a:t>credit.policy</a:t>
+            </a:r>
+            <a:r>
+              <a:rPr lang="en-US" dirty="0"/>
+              <a:t>, paid the loan, which we would generally expect. </a:t>
+            </a:r>
+          </a:p>
+          <a:p>
+            <a:pPr marL="171450" indent="-171450">
+              <a:buFont typeface="Arial" panose="020B0604020202020204" pitchFamily="34" charset="0"/>
+              <a:buChar char="•"/>
+            </a:pPr>
+            <a:r>
+              <a:rPr lang="en-US" dirty="0"/>
+              <a:t>We can also see that that those loans that did not meet the credit policy, had higher a number of inquiries in the last 6 months, and higher interest rates, would probably more susceptible of going Unpaid; this is also what we would generally expect to see. </a:t>
+            </a:r>
+          </a:p>
+          <a:p>
+            <a:pPr marL="171450" indent="-171450">
+              <a:buFont typeface="Arial" panose="020B0604020202020204" pitchFamily="34" charset="0"/>
+              <a:buChar char="•"/>
+            </a:pPr>
+            <a:r>
+              <a:rPr lang="en-US" dirty="0"/>
               <a:t>IF ASKED: we do not consider the distinction between loan purpose to be meaningful because of the number of Unpaid values among other leaf nodes and their proportion to the Paid values.</a:t>
             </a:r>
           </a:p>
@@ -1891,36 +2599,153 @@
             <a:endParaRPr lang="en-US" dirty="0"/>
           </a:p>
           <a:p>
+            <a:r>
+              <a:rPr lang="en-US" u="sng" dirty="0"/>
+              <a:t>Confusion Matrix:</a:t>
+            </a:r>
+          </a:p>
+          <a:p>
+            <a:pPr marL="171450" indent="-171450">
+              <a:buFont typeface="Arial" panose="020B0604020202020204" pitchFamily="34" charset="0"/>
+              <a:buChar char="•"/>
+            </a:pPr>
+            <a:r>
+              <a:rPr lang="en-US" u="none" dirty="0"/>
+              <a:t>So</a:t>
+            </a:r>
+            <a:r>
+              <a:rPr lang="en-US" u="none" baseline="0" dirty="0"/>
+              <a:t> we generally have less faith in this tree already, but we wanted to check out the confusion matrix stats as well to </a:t>
+            </a:r>
+            <a:r>
+              <a:rPr lang="en-US" u="none" baseline="0" dirty="0" err="1"/>
+              <a:t>guage</a:t>
+            </a:r>
+            <a:r>
+              <a:rPr lang="en-US" u="none" baseline="0" dirty="0"/>
+              <a:t> its reliability and predictability. </a:t>
+            </a:r>
+          </a:p>
+          <a:p>
+            <a:pPr marL="171450" indent="-171450">
+              <a:buFont typeface="Arial" panose="020B0604020202020204" pitchFamily="34" charset="0"/>
+              <a:buChar char="•"/>
+            </a:pPr>
+            <a:endParaRPr lang="en-US" u="none" baseline="0" dirty="0"/>
+          </a:p>
+          <a:p>
+            <a:pPr marL="171450" indent="-171450">
+              <a:buFont typeface="Arial" panose="020B0604020202020204" pitchFamily="34" charset="0"/>
+              <a:buChar char="•"/>
+            </a:pPr>
+            <a:r>
+              <a:rPr lang="en-US" u="none" baseline="0" dirty="0"/>
+              <a:t>We immediately see the extremely low specificity value, which indicates the tree was terrible at detecting those that went unpaid. That with the low AUC indicates a less than promising ROC curve. </a:t>
+            </a:r>
+          </a:p>
+          <a:p>
+            <a:pPr marL="171450" indent="-171450">
+              <a:buFont typeface="Arial" panose="020B0604020202020204" pitchFamily="34" charset="0"/>
+              <a:buChar char="•"/>
+            </a:pPr>
+            <a:endParaRPr lang="en-US" u="none" baseline="0" dirty="0"/>
+          </a:p>
+          <a:p>
+            <a:pPr marL="171450" marR="0" lvl="0" indent="-171450" algn="l" defTabSz="914400" rtl="0" eaLnBrk="1" fontAlgn="auto" latinLnBrk="0" hangingPunct="1">
+              <a:lnSpc>
+                <a:spcPct val="100000"/>
+              </a:lnSpc>
+              <a:spcBef>
+                <a:spcPts val="0"/>
+              </a:spcBef>
+              <a:spcAft>
+                <a:spcPts val="0"/>
+              </a:spcAft>
+              <a:buClrTx/>
+              <a:buSzTx/>
+              <a:buFont typeface="Arial" panose="020B0604020202020204" pitchFamily="34" charset="0"/>
+              <a:buChar char="•"/>
+              <a:tabLst/>
+              <a:defRPr/>
+            </a:pPr>
+            <a:r>
+              <a:rPr lang="en-US" dirty="0"/>
+              <a:t>Lastly, the extremely low Kappa statistic of .019, suggests there is nearly no agreement between the predictive model and the actual data. </a:t>
+            </a:r>
+          </a:p>
+          <a:p>
+            <a:pPr marL="171450" marR="0" lvl="0" indent="-171450" algn="l" defTabSz="914400" rtl="0" eaLnBrk="1" fontAlgn="auto" latinLnBrk="0" hangingPunct="1">
+              <a:lnSpc>
+                <a:spcPct val="100000"/>
+              </a:lnSpc>
+              <a:spcBef>
+                <a:spcPts val="0"/>
+              </a:spcBef>
+              <a:spcAft>
+                <a:spcPts val="0"/>
+              </a:spcAft>
+              <a:buClrTx/>
+              <a:buSzTx/>
+              <a:buFont typeface="Arial" panose="020B0604020202020204" pitchFamily="34" charset="0"/>
+              <a:buChar char="•"/>
+              <a:tabLst/>
+              <a:defRPr/>
+            </a:pPr>
             <a:endParaRPr lang="en-US" dirty="0"/>
           </a:p>
           <a:p>
+            <a:pPr marL="171450" marR="0" lvl="0" indent="-171450" algn="l" defTabSz="914400" rtl="0" eaLnBrk="1" fontAlgn="auto" latinLnBrk="0" hangingPunct="1">
+              <a:lnSpc>
+                <a:spcPct val="100000"/>
+              </a:lnSpc>
+              <a:spcBef>
+                <a:spcPts val="0"/>
+              </a:spcBef>
+              <a:spcAft>
+                <a:spcPts val="0"/>
+              </a:spcAft>
+              <a:buClrTx/>
+              <a:buSzTx/>
+              <a:buFont typeface="Arial" panose="020B0604020202020204" pitchFamily="34" charset="0"/>
+              <a:buChar char="•"/>
+              <a:tabLst/>
+              <a:defRPr/>
+            </a:pPr>
             <a:r>
               <a:rPr lang="en-US" dirty="0"/>
-              <a:t>Confusion Matrix:</a:t>
-            </a:r>
-          </a:p>
-          <a:p>
-            <a:r>
-              <a:rPr lang="en-US" dirty="0"/>
-              <a:t>Low area under ROC curve indicates the model has little to no ability to discriminate between Paid and Unpaid classes.</a:t>
-            </a:r>
-          </a:p>
-          <a:p>
+              <a:t>So</a:t>
+            </a:r>
+            <a:r>
+              <a:rPr lang="en-US" baseline="0" dirty="0"/>
+              <a:t> in summary, we determined that the classification tree for credit policy was reliable and that we could apply it going forward, while the tree for not full paid proved to be unreliable and not useful for future application.</a:t>
+            </a:r>
             <a:endParaRPr lang="en-US" dirty="0"/>
           </a:p>
           <a:p>
-            <a:r>
-              <a:rPr lang="en-US" dirty="0"/>
-              <a:t>Based on the extremely low Kappa statistic of .019, there is nearly no agreement between the predictive model and the actual data. </a:t>
-            </a:r>
-          </a:p>
-          <a:p>
             <a:endParaRPr lang="en-US" dirty="0"/>
           </a:p>
           <a:p>
-            <a:endParaRPr lang="en-US" dirty="0"/>
-          </a:p>
-          <a:p>
+            <a:pPr marL="0" marR="0" lvl="0" indent="0" algn="l" defTabSz="914400" rtl="0" eaLnBrk="1" fontAlgn="auto" latinLnBrk="0" hangingPunct="1">
+              <a:lnSpc>
+                <a:spcPct val="100000"/>
+              </a:lnSpc>
+              <a:spcBef>
+                <a:spcPts val="0"/>
+              </a:spcBef>
+              <a:spcAft>
+                <a:spcPts val="0"/>
+              </a:spcAft>
+              <a:buClrTx/>
+              <a:buSzTx/>
+              <a:buFontTx/>
+              <a:buNone/>
+              <a:tabLst/>
+              <a:defRPr/>
+            </a:pPr>
+            <a:r>
+              <a:rPr lang="en-US" u="sng" dirty="0"/>
+              <a:t>ADMIN:</a:t>
+            </a:r>
             <a:endParaRPr lang="en-US" dirty="0"/>
           </a:p>
           <a:p>
@@ -2393,7 +3218,7 @@
           <a:p>
             <a:fld id="{995EAC03-283E-463E-BE2A-0031DB3AD91B}" type="datetimeFigureOut">
               <a:rPr lang="en-US" smtClean="0"/>
-              <a:t>12/11/2022</a:t>
+              <a:t>12/12/2022</a:t>
             </a:fld>
             <a:endParaRPr lang="en-US"/>
           </a:p>
@@ -2591,7 +3416,7 @@
           <a:p>
             <a:fld id="{995EAC03-283E-463E-BE2A-0031DB3AD91B}" type="datetimeFigureOut">
               <a:rPr lang="en-US" smtClean="0"/>
-              <a:t>12/11/2022</a:t>
+              <a:t>12/12/2022</a:t>
             </a:fld>
             <a:endParaRPr lang="en-US"/>
           </a:p>
@@ -2799,7 +3624,7 @@
           <a:p>
             <a:fld id="{995EAC03-283E-463E-BE2A-0031DB3AD91B}" type="datetimeFigureOut">
               <a:rPr lang="en-US" smtClean="0"/>
-              <a:t>12/11/2022</a:t>
+              <a:t>12/12/2022</a:t>
             </a:fld>
             <a:endParaRPr lang="en-US"/>
           </a:p>
@@ -2997,7 +3822,7 @@
           <a:p>
             <a:fld id="{995EAC03-283E-463E-BE2A-0031DB3AD91B}" type="datetimeFigureOut">
               <a:rPr lang="en-US" smtClean="0"/>
-              <a:t>12/11/2022</a:t>
+              <a:t>12/12/2022</a:t>
             </a:fld>
             <a:endParaRPr lang="en-US"/>
           </a:p>
@@ -3272,7 +4097,7 @@
           <a:p>
             <a:fld id="{995EAC03-283E-463E-BE2A-0031DB3AD91B}" type="datetimeFigureOut">
               <a:rPr lang="en-US" smtClean="0"/>
-              <a:t>12/11/2022</a:t>
+              <a:t>12/12/2022</a:t>
             </a:fld>
             <a:endParaRPr lang="en-US"/>
           </a:p>
@@ -3537,7 +4362,7 @@
           <a:p>
             <a:fld id="{995EAC03-283E-463E-BE2A-0031DB3AD91B}" type="datetimeFigureOut">
               <a:rPr lang="en-US" smtClean="0"/>
-              <a:t>12/11/2022</a:t>
+              <a:t>12/12/2022</a:t>
             </a:fld>
             <a:endParaRPr lang="en-US"/>
           </a:p>
@@ -3949,7 +4774,7 @@
           <a:p>
             <a:fld id="{995EAC03-283E-463E-BE2A-0031DB3AD91B}" type="datetimeFigureOut">
               <a:rPr lang="en-US" smtClean="0"/>
-              <a:t>12/11/2022</a:t>
+              <a:t>12/12/2022</a:t>
             </a:fld>
             <a:endParaRPr lang="en-US"/>
           </a:p>
@@ -4090,7 +4915,7 @@
           <a:p>
             <a:fld id="{995EAC03-283E-463E-BE2A-0031DB3AD91B}" type="datetimeFigureOut">
               <a:rPr lang="en-US" smtClean="0"/>
-              <a:t>12/11/2022</a:t>
+              <a:t>12/12/2022</a:t>
             </a:fld>
             <a:endParaRPr lang="en-US"/>
           </a:p>
@@ -4203,7 +5028,7 @@
           <a:p>
             <a:fld id="{995EAC03-283E-463E-BE2A-0031DB3AD91B}" type="datetimeFigureOut">
               <a:rPr lang="en-US" smtClean="0"/>
-              <a:t>12/11/2022</a:t>
+              <a:t>12/12/2022</a:t>
             </a:fld>
             <a:endParaRPr lang="en-US"/>
           </a:p>
@@ -4514,7 +5339,7 @@
           <a:p>
             <a:fld id="{995EAC03-283E-463E-BE2A-0031DB3AD91B}" type="datetimeFigureOut">
               <a:rPr lang="en-US" smtClean="0"/>
-              <a:t>12/11/2022</a:t>
+              <a:t>12/12/2022</a:t>
             </a:fld>
             <a:endParaRPr lang="en-US"/>
           </a:p>
@@ -4802,7 +5627,7 @@
           <a:p>
             <a:fld id="{995EAC03-283E-463E-BE2A-0031DB3AD91B}" type="datetimeFigureOut">
               <a:rPr lang="en-US" smtClean="0"/>
-              <a:t>12/11/2022</a:t>
+              <a:t>12/12/2022</a:t>
             </a:fld>
             <a:endParaRPr lang="en-US"/>
           </a:p>
@@ -5043,7 +5868,7 @@
           <a:p>
             <a:fld id="{995EAC03-283E-463E-BE2A-0031DB3AD91B}" type="datetimeFigureOut">
               <a:rPr lang="en-US" smtClean="0"/>
-              <a:t>12/11/2022</a:t>
+              <a:t>12/12/2022</a:t>
             </a:fld>
             <a:endParaRPr lang="en-US"/>
           </a:p>
@@ -10976,172 +11801,6 @@
           </a:fontRef>
         </p:style>
       </p:cxnSp>
-      <p:sp>
-        <p:nvSpPr>
-          <p:cNvPr id="2" name="TextBox 1">
-            <a:extLst>
-              <a:ext uri="{FF2B5EF4-FFF2-40B4-BE49-F238E27FC236}">
-                <a16:creationId xmlns:a16="http://schemas.microsoft.com/office/drawing/2014/main" id="{769B97F2-949C-6AED-5947-79C707840323}"/>
-              </a:ext>
-            </a:extLst>
-          </p:cNvPr>
-          <p:cNvSpPr txBox="1"/>
-          <p:nvPr/>
-        </p:nvSpPr>
-        <p:spPr>
-          <a:xfrm>
-            <a:off x="48788" y="2134304"/>
-            <a:ext cx="4465049" cy="4478149"/>
-          </a:xfrm>
-          <a:prstGeom prst="rect">
-            <a:avLst/>
-          </a:prstGeom>
-          <a:noFill/>
-        </p:spPr>
-        <p:txBody>
-          <a:bodyPr wrap="square" rtlCol="0">
-            <a:spAutoFit/>
-          </a:bodyPr>
-          <a:lstStyle/>
-          <a:p>
-            <a:pPr marL="285750" indent="-285750">
-              <a:buFont typeface="Arial" panose="020B0604020202020204" pitchFamily="34" charset="0"/>
-              <a:buChar char="•"/>
-            </a:pPr>
-            <a:r>
-              <a:rPr lang="en-US" sz="1900" b="1" dirty="0"/>
-              <a:t>Tree</a:t>
-            </a:r>
-          </a:p>
-          <a:p>
-            <a:pPr marL="742950" lvl="1" indent="-285750">
-              <a:buFont typeface="Arial" panose="020B0604020202020204" pitchFamily="34" charset="0"/>
-              <a:buChar char="•"/>
-            </a:pPr>
-            <a:r>
-              <a:rPr lang="en-US" sz="1900" dirty="0"/>
-              <a:t>Three variables</a:t>
-            </a:r>
-          </a:p>
-          <a:p>
-            <a:pPr marL="742950" lvl="1" indent="-285750">
-              <a:buFont typeface="Arial" panose="020B0604020202020204" pitchFamily="34" charset="0"/>
-              <a:buChar char="•"/>
-            </a:pPr>
-            <a:r>
-              <a:rPr lang="en-US" sz="1900" dirty="0"/>
-              <a:t>4 splits</a:t>
-            </a:r>
-          </a:p>
-          <a:p>
-            <a:pPr marL="742950" lvl="1" indent="-285750">
-              <a:buFont typeface="Arial" panose="020B0604020202020204" pitchFamily="34" charset="0"/>
-              <a:buChar char="•"/>
-            </a:pPr>
-            <a:endParaRPr lang="en-US" sz="1900" dirty="0"/>
-          </a:p>
-          <a:p>
-            <a:pPr marL="285750" indent="-285750">
-              <a:buFont typeface="Arial" panose="020B0604020202020204" pitchFamily="34" charset="0"/>
-              <a:buChar char="•"/>
-            </a:pPr>
-            <a:r>
-              <a:rPr lang="en-US" sz="1900" b="1" dirty="0"/>
-              <a:t>Confusion Matrix</a:t>
-            </a:r>
-          </a:p>
-          <a:p>
-            <a:pPr marL="742950" lvl="1" indent="-285750">
-              <a:buFont typeface="Arial" panose="020B0604020202020204" pitchFamily="34" charset="0"/>
-              <a:buChar char="•"/>
-            </a:pPr>
-            <a:r>
-              <a:rPr lang="en-US" sz="1900" dirty="0"/>
-              <a:t>Specificity: 0.999</a:t>
-            </a:r>
-          </a:p>
-          <a:p>
-            <a:pPr marL="742950" lvl="1" indent="-285750">
-              <a:buFont typeface="Arial" panose="020B0604020202020204" pitchFamily="34" charset="0"/>
-              <a:buChar char="•"/>
-            </a:pPr>
-            <a:r>
-              <a:rPr lang="en-US" sz="1900" dirty="0"/>
-              <a:t>Recall/Sensitivity: 0.794</a:t>
-            </a:r>
-          </a:p>
-          <a:p>
-            <a:pPr marL="742950" lvl="1" indent="-285750">
-              <a:buFont typeface="Arial" panose="020B0604020202020204" pitchFamily="34" charset="0"/>
-              <a:buChar char="•"/>
-            </a:pPr>
-            <a:r>
-              <a:rPr lang="en-US" sz="1900" dirty="0"/>
-              <a:t>Precision: 0.996</a:t>
-            </a:r>
-          </a:p>
-          <a:p>
-            <a:pPr marL="742950" lvl="1" indent="-285750">
-              <a:buFont typeface="Arial" panose="020B0604020202020204" pitchFamily="34" charset="0"/>
-              <a:buChar char="•"/>
-            </a:pPr>
-            <a:r>
-              <a:rPr lang="en-US" sz="1900" dirty="0"/>
-              <a:t>AUC: 0.900</a:t>
-            </a:r>
-          </a:p>
-          <a:p>
-            <a:pPr marL="742950" lvl="1" indent="-285750">
-              <a:buFont typeface="Arial" panose="020B0604020202020204" pitchFamily="34" charset="0"/>
-              <a:buChar char="•"/>
-            </a:pPr>
-            <a:r>
-              <a:rPr lang="en-US" sz="1900" dirty="0"/>
-              <a:t>Kappa: 0.859</a:t>
-            </a:r>
-          </a:p>
-          <a:p>
-            <a:pPr marL="285750" indent="-285750">
-              <a:buFont typeface="Arial" panose="020B0604020202020204" pitchFamily="34" charset="0"/>
-              <a:buChar char="•"/>
-            </a:pPr>
-            <a:endParaRPr lang="en-US" sz="1900" dirty="0"/>
-          </a:p>
-          <a:p>
-            <a:pPr marL="285750" indent="-285750">
-              <a:buFont typeface="Arial" panose="020B0604020202020204" pitchFamily="34" charset="0"/>
-              <a:buChar char="•"/>
-            </a:pPr>
-            <a:r>
-              <a:rPr lang="en-US" sz="1900" b="1" dirty="0"/>
-              <a:t>Predictions vs Actual</a:t>
-            </a:r>
-          </a:p>
-          <a:p>
-            <a:pPr marL="742950" lvl="1" indent="-285750">
-              <a:buFont typeface="Arial" panose="020B0604020202020204" pitchFamily="34" charset="0"/>
-              <a:buChar char="•"/>
-            </a:pPr>
-            <a:r>
-              <a:rPr lang="en-US" sz="1900" dirty="0"/>
-              <a:t>1483/1868 true positives/fails</a:t>
-            </a:r>
-          </a:p>
-          <a:p>
-            <a:pPr marL="742950" lvl="1" indent="-285750">
-              <a:buFont typeface="Arial" panose="020B0604020202020204" pitchFamily="34" charset="0"/>
-              <a:buChar char="•"/>
-            </a:pPr>
-            <a:r>
-              <a:rPr lang="en-US" sz="1900" dirty="0"/>
-              <a:t>7704/7710 true negatives/meets</a:t>
-            </a:r>
-          </a:p>
-          <a:p>
-            <a:endParaRPr lang="en-US" sz="1900" dirty="0"/>
-          </a:p>
-        </p:txBody>
-      </p:sp>
       <p:pic>
         <p:nvPicPr>
           <p:cNvPr id="16" name="Picture 15">
@@ -11199,7 +11858,7 @@
           </p:cNvPicPr>
           <p:nvPr/>
         </p:nvPicPr>
-        <p:blipFill>
+        <p:blipFill rotWithShape="1">
           <a:blip r:embed="rId6">
             <a:extLst>
               <a:ext uri="{28A0092B-C50C-407E-A947-70E740481C1C}">
@@ -11207,24 +11866,186 @@
               </a:ext>
             </a:extLst>
           </a:blip>
-          <a:stretch>
-            <a:fillRect/>
-          </a:stretch>
+          <a:srcRect l="4056" r="3680" b="3972"/>
+          <a:stretch/>
         </p:blipFill>
         <p:spPr>
           <a:xfrm>
-            <a:off x="4066279" y="1508852"/>
-            <a:ext cx="8125722" cy="5020536"/>
+            <a:off x="4868636" y="2065347"/>
+            <a:ext cx="7334250" cy="4716453"/>
           </a:xfrm>
           <a:prstGeom prst="rect">
             <a:avLst/>
           </a:prstGeom>
         </p:spPr>
       </p:pic>
+      <p:sp>
+        <p:nvSpPr>
+          <p:cNvPr id="2" name="TextBox 1">
+            <a:extLst>
+              <a:ext uri="{FF2B5EF4-FFF2-40B4-BE49-F238E27FC236}">
+                <a16:creationId xmlns:a16="http://schemas.microsoft.com/office/drawing/2014/main" id="{769B97F2-949C-6AED-5947-79C707840323}"/>
+              </a:ext>
+            </a:extLst>
+          </p:cNvPr>
+          <p:cNvSpPr txBox="1"/>
+          <p:nvPr/>
+        </p:nvSpPr>
+        <p:spPr>
+          <a:xfrm>
+            <a:off x="10688" y="2039054"/>
+            <a:ext cx="5437612" cy="4185761"/>
+          </a:xfrm>
+          <a:prstGeom prst="rect">
+            <a:avLst/>
+          </a:prstGeom>
+          <a:noFill/>
+        </p:spPr>
+        <p:txBody>
+          <a:bodyPr wrap="square" rtlCol="0">
+            <a:spAutoFit/>
+          </a:bodyPr>
+          <a:lstStyle/>
+          <a:p>
+            <a:pPr marL="285750" indent="-285750">
+              <a:buFont typeface="Arial" panose="020B0604020202020204" pitchFamily="34" charset="0"/>
+              <a:buChar char="•"/>
+            </a:pPr>
+            <a:r>
+              <a:rPr lang="en-US" sz="1900" b="1" dirty="0"/>
+              <a:t>Tree</a:t>
+            </a:r>
+          </a:p>
+          <a:p>
+            <a:pPr marL="742950" lvl="1" indent="-285750">
+              <a:buFont typeface="Arial" panose="020B0604020202020204" pitchFamily="34" charset="0"/>
+              <a:buChar char="•"/>
+            </a:pPr>
+            <a:r>
+              <a:rPr lang="en-US" sz="1900" dirty="0"/>
+              <a:t>Three variables</a:t>
+            </a:r>
+          </a:p>
+          <a:p>
+            <a:pPr marL="742950" lvl="1" indent="-285750">
+              <a:buFont typeface="Arial" panose="020B0604020202020204" pitchFamily="34" charset="0"/>
+              <a:buChar char="•"/>
+            </a:pPr>
+            <a:r>
+              <a:rPr lang="en-US" sz="1900" dirty="0"/>
+              <a:t>4 splits</a:t>
+            </a:r>
+          </a:p>
+          <a:p>
+            <a:pPr marL="742950" lvl="1" indent="-285750">
+              <a:buFont typeface="Arial" panose="020B0604020202020204" pitchFamily="34" charset="0"/>
+              <a:buChar char="•"/>
+            </a:pPr>
+            <a:endParaRPr lang="en-US" sz="1900" dirty="0"/>
+          </a:p>
+          <a:p>
+            <a:pPr marL="285750" indent="-285750">
+              <a:buFont typeface="Arial" panose="020B0604020202020204" pitchFamily="34" charset="0"/>
+              <a:buChar char="•"/>
+            </a:pPr>
+            <a:r>
+              <a:rPr lang="en-US" sz="1900" b="1" dirty="0"/>
+              <a:t>Confusion Matrix</a:t>
+            </a:r>
+          </a:p>
+          <a:p>
+            <a:pPr marL="742950" lvl="1" indent="-285750">
+              <a:buFont typeface="Arial" panose="020B0604020202020204" pitchFamily="34" charset="0"/>
+              <a:buChar char="•"/>
+            </a:pPr>
+            <a:r>
+              <a:rPr lang="en-US" sz="1900" dirty="0"/>
+              <a:t>Specificity: 0.999</a:t>
+            </a:r>
+          </a:p>
+          <a:p>
+            <a:pPr marL="742950" lvl="1" indent="-285750">
+              <a:buFont typeface="Arial" panose="020B0604020202020204" pitchFamily="34" charset="0"/>
+              <a:buChar char="•"/>
+            </a:pPr>
+            <a:r>
+              <a:rPr lang="en-US" sz="1900" dirty="0"/>
+              <a:t>Recall/Sensitivity: 0.794</a:t>
+            </a:r>
+          </a:p>
+          <a:p>
+            <a:pPr marL="742950" lvl="1" indent="-285750">
+              <a:buFont typeface="Arial" panose="020B0604020202020204" pitchFamily="34" charset="0"/>
+              <a:buChar char="•"/>
+            </a:pPr>
+            <a:r>
+              <a:rPr lang="en-US" sz="1900" dirty="0"/>
+              <a:t>Precision: 0.996</a:t>
+            </a:r>
+          </a:p>
+          <a:p>
+            <a:pPr marL="742950" lvl="1" indent="-285750">
+              <a:buFont typeface="Arial" panose="020B0604020202020204" pitchFamily="34" charset="0"/>
+              <a:buChar char="•"/>
+            </a:pPr>
+            <a:r>
+              <a:rPr lang="en-US" sz="1900" dirty="0"/>
+              <a:t>AUC: 0.900</a:t>
+            </a:r>
+          </a:p>
+          <a:p>
+            <a:pPr marL="742950" lvl="1" indent="-285750">
+              <a:buFont typeface="Arial" panose="020B0604020202020204" pitchFamily="34" charset="0"/>
+              <a:buChar char="•"/>
+            </a:pPr>
+            <a:r>
+              <a:rPr lang="en-US" sz="1900" dirty="0"/>
+              <a:t>Kappa: 0.859</a:t>
+            </a:r>
+          </a:p>
+          <a:p>
+            <a:pPr marL="285750" indent="-285750">
+              <a:buFont typeface="Arial" panose="020B0604020202020204" pitchFamily="34" charset="0"/>
+              <a:buChar char="•"/>
+            </a:pPr>
+            <a:endParaRPr lang="en-US" sz="1900" dirty="0"/>
+          </a:p>
+          <a:p>
+            <a:pPr marL="285750" indent="-285750">
+              <a:buFont typeface="Arial" panose="020B0604020202020204" pitchFamily="34" charset="0"/>
+              <a:buChar char="•"/>
+            </a:pPr>
+            <a:r>
+              <a:rPr lang="en-US" sz="1900" b="1" dirty="0"/>
+              <a:t>Predictions vs Actual</a:t>
+            </a:r>
+          </a:p>
+          <a:p>
+            <a:pPr marL="742950" lvl="1" indent="-285750">
+              <a:buFont typeface="Arial" panose="020B0604020202020204" pitchFamily="34" charset="0"/>
+              <a:buChar char="•"/>
+            </a:pPr>
+            <a:r>
+              <a:rPr lang="en-US" sz="1900" dirty="0"/>
+              <a:t>1483 predicted fails vs 1868 actual fails</a:t>
+            </a:r>
+          </a:p>
+          <a:p>
+            <a:pPr marL="742950" lvl="1" indent="-285750">
+              <a:buFont typeface="Arial" panose="020B0604020202020204" pitchFamily="34" charset="0"/>
+              <a:buChar char="•"/>
+            </a:pPr>
+            <a:r>
+              <a:rPr lang="en-US" sz="1900" dirty="0"/>
+              <a:t>7704 predicted meets vs 7710 actual meets</a:t>
+            </a:r>
+          </a:p>
+        </p:txBody>
+      </p:sp>
     </p:spTree>
     <p:extLst>
       <p:ext uri="{BB962C8B-B14F-4D97-AF65-F5344CB8AC3E}">
-        <p14:creationId xmlns:p14="http://schemas.microsoft.com/office/powerpoint/2010/main" val="1836251204"/>
+        <p14:creationId xmlns:p14="http://schemas.microsoft.com/office/powerpoint/2010/main" val="3842065964"/>
       </p:ext>
     </p:extLst>
   </p:cSld>
@@ -11392,182 +12213,6 @@
           </a:fontRef>
         </p:style>
       </p:cxnSp>
-      <p:sp>
-        <p:nvSpPr>
-          <p:cNvPr id="2" name="TextBox 1">
-            <a:extLst>
-              <a:ext uri="{FF2B5EF4-FFF2-40B4-BE49-F238E27FC236}">
-                <a16:creationId xmlns:a16="http://schemas.microsoft.com/office/drawing/2014/main" id="{769B97F2-949C-6AED-5947-79C707840323}"/>
-              </a:ext>
-            </a:extLst>
-          </p:cNvPr>
-          <p:cNvSpPr txBox="1"/>
-          <p:nvPr/>
-        </p:nvSpPr>
-        <p:spPr>
-          <a:xfrm>
-            <a:off x="256606" y="2187743"/>
-            <a:ext cx="4465049" cy="4770537"/>
-          </a:xfrm>
-          <a:prstGeom prst="rect">
-            <a:avLst/>
-          </a:prstGeom>
-          <a:noFill/>
-        </p:spPr>
-        <p:txBody>
-          <a:bodyPr wrap="square" rtlCol="0">
-            <a:spAutoFit/>
-          </a:bodyPr>
-          <a:lstStyle/>
-          <a:p>
-            <a:pPr marL="285750" indent="-285750">
-              <a:buFont typeface="Arial" panose="020B0604020202020204" pitchFamily="34" charset="0"/>
-              <a:buChar char="•"/>
-            </a:pPr>
-            <a:r>
-              <a:rPr lang="en-US" sz="1900" b="1" dirty="0"/>
-              <a:t>Tree</a:t>
-            </a:r>
-          </a:p>
-          <a:p>
-            <a:pPr marL="742950" lvl="1" indent="-285750">
-              <a:buFont typeface="Arial" panose="020B0604020202020204" pitchFamily="34" charset="0"/>
-              <a:buChar char="•"/>
-            </a:pPr>
-            <a:r>
-              <a:rPr lang="en-US" sz="1900" dirty="0"/>
-              <a:t>CP forced to .001</a:t>
-            </a:r>
-          </a:p>
-          <a:p>
-            <a:pPr marL="742950" lvl="1" indent="-285750">
-              <a:buFont typeface="Arial" panose="020B0604020202020204" pitchFamily="34" charset="0"/>
-              <a:buChar char="•"/>
-            </a:pPr>
-            <a:r>
-              <a:rPr lang="en-US" sz="1900" dirty="0"/>
-              <a:t>Four variables</a:t>
-            </a:r>
-          </a:p>
-          <a:p>
-            <a:pPr marL="742950" lvl="1" indent="-285750">
-              <a:buFont typeface="Arial" panose="020B0604020202020204" pitchFamily="34" charset="0"/>
-              <a:buChar char="•"/>
-            </a:pPr>
-            <a:r>
-              <a:rPr lang="en-US" sz="1900" dirty="0"/>
-              <a:t>4 splits</a:t>
-            </a:r>
-          </a:p>
-          <a:p>
-            <a:pPr marL="742950" lvl="1" indent="-285750">
-              <a:buFont typeface="Arial" panose="020B0604020202020204" pitchFamily="34" charset="0"/>
-              <a:buChar char="•"/>
-            </a:pPr>
-            <a:endParaRPr lang="en-US" sz="1900" dirty="0"/>
-          </a:p>
-          <a:p>
-            <a:pPr marL="285750" indent="-285750">
-              <a:buFont typeface="Arial" panose="020B0604020202020204" pitchFamily="34" charset="0"/>
-              <a:buChar char="•"/>
-            </a:pPr>
-            <a:r>
-              <a:rPr lang="en-US" sz="1900" b="1" dirty="0"/>
-              <a:t>Confusion Matrix</a:t>
-            </a:r>
-          </a:p>
-          <a:p>
-            <a:pPr marL="742950" lvl="1" indent="-285750">
-              <a:buFont typeface="Arial" panose="020B0604020202020204" pitchFamily="34" charset="0"/>
-              <a:buChar char="•"/>
-            </a:pPr>
-            <a:r>
-              <a:rPr lang="en-US" sz="1900" dirty="0"/>
-              <a:t>Specificity: 0.013</a:t>
-            </a:r>
-          </a:p>
-          <a:p>
-            <a:pPr marL="742950" lvl="1" indent="-285750">
-              <a:buFont typeface="Arial" panose="020B0604020202020204" pitchFamily="34" charset="0"/>
-              <a:buChar char="•"/>
-            </a:pPr>
-            <a:r>
-              <a:rPr lang="en-US" sz="1900" dirty="0"/>
-              <a:t>Recall/Sensitivity: 0.999</a:t>
-            </a:r>
-          </a:p>
-          <a:p>
-            <a:pPr marL="742950" lvl="1" indent="-285750">
-              <a:buFont typeface="Arial" panose="020B0604020202020204" pitchFamily="34" charset="0"/>
-              <a:buChar char="•"/>
-            </a:pPr>
-            <a:r>
-              <a:rPr lang="en-US" sz="1900" dirty="0"/>
-              <a:t>Precision: 0.842</a:t>
-            </a:r>
-          </a:p>
-          <a:p>
-            <a:pPr marL="742950" lvl="1" indent="-285750">
-              <a:buFont typeface="Arial" panose="020B0604020202020204" pitchFamily="34" charset="0"/>
-              <a:buChar char="•"/>
-            </a:pPr>
-            <a:r>
-              <a:rPr lang="en-US" sz="1900" dirty="0"/>
-              <a:t>AUC: 0.59</a:t>
-            </a:r>
-          </a:p>
-          <a:p>
-            <a:pPr marL="742950" lvl="1" indent="-285750">
-              <a:buFont typeface="Arial" panose="020B0604020202020204" pitchFamily="34" charset="0"/>
-              <a:buChar char="•"/>
-            </a:pPr>
-            <a:r>
-              <a:rPr lang="en-US" sz="1900" dirty="0"/>
-              <a:t>Kappa: 0.019</a:t>
-            </a:r>
-          </a:p>
-          <a:p>
-            <a:pPr marL="285750" indent="-285750">
-              <a:buFont typeface="Arial" panose="020B0604020202020204" pitchFamily="34" charset="0"/>
-              <a:buChar char="•"/>
-            </a:pPr>
-            <a:endParaRPr lang="en-US" sz="1900" dirty="0"/>
-          </a:p>
-          <a:p>
-            <a:pPr marL="285750" indent="-285750">
-              <a:buFont typeface="Arial" panose="020B0604020202020204" pitchFamily="34" charset="0"/>
-              <a:buChar char="•"/>
-            </a:pPr>
-            <a:r>
-              <a:rPr lang="en-US" sz="1900" b="1" dirty="0"/>
-              <a:t>Predictions vs Actual</a:t>
-            </a:r>
-          </a:p>
-          <a:p>
-            <a:pPr marL="742950" lvl="1" indent="-285750">
-              <a:buFont typeface="Arial" panose="020B0604020202020204" pitchFamily="34" charset="0"/>
-              <a:buChar char="•"/>
-            </a:pPr>
-            <a:r>
-              <a:rPr lang="en-US" sz="1900" dirty="0"/>
-              <a:t>8034/8045 true negatives/paid</a:t>
-            </a:r>
-          </a:p>
-          <a:p>
-            <a:pPr marL="742950" lvl="1" indent="-285750">
-              <a:buFont typeface="Arial" panose="020B0604020202020204" pitchFamily="34" charset="0"/>
-              <a:buChar char="•"/>
-            </a:pPr>
-            <a:r>
-              <a:rPr lang="en-US" sz="1900" dirty="0"/>
-              <a:t>20/1533 true positives/unpaid</a:t>
-            </a:r>
-          </a:p>
-          <a:p>
-            <a:endParaRPr lang="en-US" sz="1900" dirty="0"/>
-          </a:p>
-        </p:txBody>
-      </p:sp>
       <p:pic>
         <p:nvPicPr>
           <p:cNvPr id="10" name="Picture 9" descr="Diagram&#10;&#10;Description automatically generated">
@@ -11582,7 +12227,7 @@
           </p:cNvPicPr>
           <p:nvPr/>
         </p:nvPicPr>
-        <p:blipFill>
+        <p:blipFill rotWithShape="1">
           <a:blip r:embed="rId4">
             <a:extLst>
               <a:ext uri="{28A0092B-C50C-407E-A947-70E740481C1C}">
@@ -11590,14 +12235,13 @@
               </a:ext>
             </a:extLst>
           </a:blip>
-          <a:stretch>
-            <a:fillRect/>
-          </a:stretch>
+          <a:srcRect l="1720" t="4701" r="4667" b="4387"/>
+          <a:stretch/>
         </p:blipFill>
         <p:spPr>
           <a:xfrm>
-            <a:off x="4845661" y="1497882"/>
-            <a:ext cx="7346339" cy="5247384"/>
+            <a:off x="5314950" y="1916012"/>
+            <a:ext cx="6877050" cy="4770537"/>
           </a:xfrm>
           <a:prstGeom prst="rect">
             <a:avLst/>
@@ -11647,10 +12291,212 @@
           </a:prstGeom>
         </p:spPr>
       </p:pic>
+      <p:sp>
+        <p:nvSpPr>
+          <p:cNvPr id="2" name="TextBox 1">
+            <a:extLst>
+              <a:ext uri="{FF2B5EF4-FFF2-40B4-BE49-F238E27FC236}">
+                <a16:creationId xmlns:a16="http://schemas.microsoft.com/office/drawing/2014/main" id="{769B97F2-949C-6AED-5947-79C707840323}"/>
+              </a:ext>
+            </a:extLst>
+          </p:cNvPr>
+          <p:cNvSpPr txBox="1"/>
+          <p:nvPr/>
+        </p:nvSpPr>
+        <p:spPr>
+          <a:xfrm>
+            <a:off x="256605" y="1801975"/>
+            <a:ext cx="5429819" cy="4770537"/>
+          </a:xfrm>
+          <a:prstGeom prst="rect">
+            <a:avLst/>
+          </a:prstGeom>
+          <a:noFill/>
+        </p:spPr>
+        <p:txBody>
+          <a:bodyPr wrap="square" rtlCol="0">
+            <a:spAutoFit/>
+          </a:bodyPr>
+          <a:lstStyle/>
+          <a:p>
+            <a:pPr marL="285750" indent="-285750">
+              <a:buFont typeface="Arial" panose="020B0604020202020204" pitchFamily="34" charset="0"/>
+              <a:buChar char="•"/>
+            </a:pPr>
+            <a:r>
+              <a:rPr lang="en-US" sz="1900" b="1" dirty="0"/>
+              <a:t>Tree</a:t>
+            </a:r>
+          </a:p>
+          <a:p>
+            <a:pPr marL="742950" lvl="1" indent="-285750">
+              <a:buFont typeface="Arial" panose="020B0604020202020204" pitchFamily="34" charset="0"/>
+              <a:buChar char="•"/>
+            </a:pPr>
+            <a:r>
+              <a:rPr lang="en-US" sz="1900" dirty="0"/>
+              <a:t>Complexity Parameter forced to .001</a:t>
+            </a:r>
+          </a:p>
+          <a:p>
+            <a:pPr marL="742950" lvl="1" indent="-285750">
+              <a:buFont typeface="Arial" panose="020B0604020202020204" pitchFamily="34" charset="0"/>
+              <a:buChar char="•"/>
+            </a:pPr>
+            <a:r>
+              <a:rPr lang="en-US" sz="1900" dirty="0"/>
+              <a:t>Four variables</a:t>
+            </a:r>
+          </a:p>
+          <a:p>
+            <a:pPr marL="742950" lvl="1" indent="-285750">
+              <a:buFont typeface="Arial" panose="020B0604020202020204" pitchFamily="34" charset="0"/>
+              <a:buChar char="•"/>
+            </a:pPr>
+            <a:r>
+              <a:rPr lang="en-US" sz="1900" dirty="0"/>
+              <a:t>4 splits</a:t>
+            </a:r>
+          </a:p>
+          <a:p>
+            <a:pPr marL="742950" lvl="1" indent="-285750">
+              <a:buFont typeface="Arial" panose="020B0604020202020204" pitchFamily="34" charset="0"/>
+              <a:buChar char="•"/>
+            </a:pPr>
+            <a:endParaRPr lang="en-US" sz="1900" dirty="0"/>
+          </a:p>
+          <a:p>
+            <a:pPr marL="285750" indent="-285750">
+              <a:buFont typeface="Arial" panose="020B0604020202020204" pitchFamily="34" charset="0"/>
+              <a:buChar char="•"/>
+            </a:pPr>
+            <a:r>
+              <a:rPr lang="en-US" sz="1900" b="1" dirty="0"/>
+              <a:t>Confusion Matrix</a:t>
+            </a:r>
+          </a:p>
+          <a:p>
+            <a:pPr marL="742950" lvl="1" indent="-285750">
+              <a:buFont typeface="Arial" panose="020B0604020202020204" pitchFamily="34" charset="0"/>
+              <a:buChar char="•"/>
+            </a:pPr>
+            <a:r>
+              <a:rPr lang="en-US" sz="1900" dirty="0"/>
+              <a:t>Specificity: 0.013</a:t>
+            </a:r>
+          </a:p>
+          <a:p>
+            <a:pPr marL="742950" lvl="1" indent="-285750">
+              <a:buFont typeface="Arial" panose="020B0604020202020204" pitchFamily="34" charset="0"/>
+              <a:buChar char="•"/>
+            </a:pPr>
+            <a:r>
+              <a:rPr lang="en-US" sz="1900" dirty="0"/>
+              <a:t>Recall/Sensitivity: 0.999</a:t>
+            </a:r>
+          </a:p>
+          <a:p>
+            <a:pPr marL="742950" lvl="1" indent="-285750">
+              <a:buFont typeface="Arial" panose="020B0604020202020204" pitchFamily="34" charset="0"/>
+              <a:buChar char="•"/>
+            </a:pPr>
+            <a:r>
+              <a:rPr lang="en-US" sz="1900" dirty="0"/>
+              <a:t>Precision: 0.842</a:t>
+            </a:r>
+          </a:p>
+          <a:p>
+            <a:pPr marL="742950" lvl="1" indent="-285750">
+              <a:buFont typeface="Arial" panose="020B0604020202020204" pitchFamily="34" charset="0"/>
+              <a:buChar char="•"/>
+            </a:pPr>
+            <a:r>
+              <a:rPr lang="en-US" sz="1900" dirty="0"/>
+              <a:t>AUC: 0.59</a:t>
+            </a:r>
+          </a:p>
+          <a:p>
+            <a:pPr marL="742950" lvl="1" indent="-285750">
+              <a:buFont typeface="Arial" panose="020B0604020202020204" pitchFamily="34" charset="0"/>
+              <a:buChar char="•"/>
+            </a:pPr>
+            <a:r>
+              <a:rPr lang="en-US" sz="1900" dirty="0"/>
+              <a:t>Kappa: 0.019</a:t>
+            </a:r>
+          </a:p>
+          <a:p>
+            <a:pPr marL="285750" indent="-285750">
+              <a:buFont typeface="Arial" panose="020B0604020202020204" pitchFamily="34" charset="0"/>
+              <a:buChar char="•"/>
+            </a:pPr>
+            <a:endParaRPr lang="en-US" sz="1900" dirty="0"/>
+          </a:p>
+          <a:p>
+            <a:pPr marL="285750" indent="-285750">
+              <a:buFont typeface="Arial" panose="020B0604020202020204" pitchFamily="34" charset="0"/>
+              <a:buChar char="•"/>
+            </a:pPr>
+            <a:r>
+              <a:rPr lang="en-US" sz="1900" b="1" dirty="0"/>
+              <a:t>Predictions vs Actual</a:t>
+            </a:r>
+          </a:p>
+          <a:p>
+            <a:pPr marL="742950" lvl="1" indent="-285750">
+              <a:buFont typeface="Arial" panose="020B0604020202020204" pitchFamily="34" charset="0"/>
+              <a:buChar char="•"/>
+            </a:pPr>
+            <a:r>
+              <a:rPr lang="en-US" sz="1900" dirty="0"/>
+              <a:t>8034 predicted </a:t>
+            </a:r>
+            <a:r>
+              <a:rPr lang="en-US" sz="1900" dirty="0" err="1"/>
+              <a:t>paids</a:t>
+            </a:r>
+            <a:r>
+              <a:rPr lang="en-US" sz="1900" dirty="0"/>
+              <a:t> vs 8045 actual </a:t>
+            </a:r>
+            <a:r>
+              <a:rPr lang="en-US" sz="1900" dirty="0" err="1"/>
+              <a:t>paids</a:t>
+            </a:r>
+            <a:endParaRPr lang="en-US" sz="1900" dirty="0"/>
+          </a:p>
+          <a:p>
+            <a:pPr marL="742950" lvl="1" indent="-285750">
+              <a:buFont typeface="Arial" panose="020B0604020202020204" pitchFamily="34" charset="0"/>
+              <a:buChar char="•"/>
+            </a:pPr>
+            <a:r>
+              <a:rPr lang="en-US" sz="1900" dirty="0"/>
+              <a:t>20 predicted </a:t>
+            </a:r>
+            <a:r>
+              <a:rPr lang="en-US" sz="1900" dirty="0" err="1"/>
+              <a:t>unpaids</a:t>
+            </a:r>
+            <a:r>
+              <a:rPr lang="en-US" sz="1900" dirty="0"/>
+              <a:t> vs 1533 actual </a:t>
+            </a:r>
+            <a:r>
+              <a:rPr lang="en-US" sz="1900" dirty="0" err="1"/>
+              <a:t>unpaids</a:t>
+            </a:r>
+            <a:endParaRPr lang="en-US" sz="1900" dirty="0"/>
+          </a:p>
+          <a:p>
+            <a:endParaRPr lang="en-US" sz="1900" dirty="0"/>
+          </a:p>
+        </p:txBody>
+      </p:sp>
     </p:spTree>
     <p:extLst>
       <p:ext uri="{BB962C8B-B14F-4D97-AF65-F5344CB8AC3E}">
-        <p14:creationId xmlns:p14="http://schemas.microsoft.com/office/powerpoint/2010/main" val="1307377937"/>
+        <p14:creationId xmlns:p14="http://schemas.microsoft.com/office/powerpoint/2010/main" val="2066563057"/>
       </p:ext>
     </p:extLst>
   </p:cSld>

</xml_diff>